<commit_message>
corrected url in title and added city information
</commit_message>
<xml_diff>
--- a/vedant.pptx
+++ b/vedant.pptx
@@ -3344,7 +3344,7 @@
           <a:p>
             <a:r>
               <a:rPr lang="en-US" dirty="0"/>
-              <a:t>vit</a:t>
+              <a:t>Vit.edu</a:t>
             </a:r>
           </a:p>
         </p:txBody>
@@ -3370,7 +3370,10 @@
           <a:bodyPr/>
           <a:lstStyle/>
           <a:p>
-            <a:endParaRPr lang="en-US"/>
+            <a:r>
+              <a:rPr lang="en-US"/>
+              <a:t>pune</a:t>
+            </a:r>
           </a:p>
         </p:txBody>
       </p:sp>

</xml_diff>